<commit_message>
Ready to Present SRS for discussion.
</commit_message>
<xml_diff>
--- a/docs/Presentations/SRS_Presentation/Kiran Singh - SRS Presentation - Image Feature Correspondences.pptx
+++ b/docs/Presentations/SRS_Presentation/Kiran Singh - SRS Presentation - Image Feature Correspondences.pptx
@@ -34919,7 +34919,7 @@
           <a:p>
             <a:r>
               <a:rPr lang="en-US" sz="2800" dirty="0"/>
-              <a:t>Adaptation to a defined scale, </a:t>
+              <a:t>Adapt to a defined scale, </a:t>
             </a:r>
             <a:r>
               <a:rPr lang="el-GR" sz="2800" dirty="0"/>
@@ -34927,7 +34927,7 @@
             </a:r>
             <a:r>
               <a:rPr lang="en-US" sz="2800" dirty="0"/>
-              <a:t> with a Gaussian Kernel * </a:t>
+              <a:t>, with a Gaussian Kernel * </a:t>
             </a:r>
           </a:p>
           <a:p>
@@ -35049,6 +35049,80 @@
           </a:prstGeom>
         </p:spPr>
       </p:pic>
+      <p:pic>
+        <p:nvPicPr>
+          <p:cNvPr id="7" name="Picture 6">
+            <a:extLst>
+              <a:ext uri="{FF2B5EF4-FFF2-40B4-BE49-F238E27FC236}">
+                <a16:creationId xmlns:a16="http://schemas.microsoft.com/office/drawing/2014/main" id="{F4F6816A-6D12-B4A0-E8EF-93D21F2B891E}"/>
+              </a:ext>
+            </a:extLst>
+          </p:cNvPr>
+          <p:cNvPicPr>
+            <a:picLocks noChangeAspect="1"/>
+          </p:cNvPicPr>
+          <p:nvPr/>
+        </p:nvPicPr>
+        <p:blipFill>
+          <a:blip r:embed="rId4"/>
+          <a:stretch>
+            <a:fillRect/>
+          </a:stretch>
+        </p:blipFill>
+        <p:spPr>
+          <a:xfrm>
+            <a:off x="13380008" y="3168130"/>
+            <a:ext cx="5020376" cy="6716062"/>
+          </a:xfrm>
+          <a:prstGeom prst="rect">
+            <a:avLst/>
+          </a:prstGeom>
+        </p:spPr>
+      </p:pic>
+      <p:cxnSp>
+        <p:nvCxnSpPr>
+          <p:cNvPr id="9" name="Straight Arrow Connector 8">
+            <a:extLst>
+              <a:ext uri="{FF2B5EF4-FFF2-40B4-BE49-F238E27FC236}">
+                <a16:creationId xmlns:a16="http://schemas.microsoft.com/office/drawing/2014/main" id="{1515BAA5-C1ED-9D61-57C1-46C0BACF0F6D}"/>
+              </a:ext>
+            </a:extLst>
+          </p:cNvPr>
+          <p:cNvCxnSpPr>
+            <a:cxnSpLocks/>
+          </p:cNvCxnSpPr>
+          <p:nvPr/>
+        </p:nvCxnSpPr>
+        <p:spPr>
+          <a:xfrm>
+            <a:off x="7152968" y="8406581"/>
+            <a:ext cx="5705866" cy="0"/>
+          </a:xfrm>
+          <a:prstGeom prst="straightConnector1">
+            <a:avLst/>
+          </a:prstGeom>
+          <a:ln w="57150">
+            <a:solidFill>
+              <a:schemeClr val="accent2"/>
+            </a:solidFill>
+            <a:tailEnd type="triangle"/>
+          </a:ln>
+        </p:spPr>
+        <p:style>
+          <a:lnRef idx="2">
+            <a:schemeClr val="accent2"/>
+          </a:lnRef>
+          <a:fillRef idx="0">
+            <a:schemeClr val="accent2"/>
+          </a:fillRef>
+          <a:effectRef idx="1">
+            <a:schemeClr val="accent2"/>
+          </a:effectRef>
+          <a:fontRef idx="minor">
+            <a:schemeClr val="tx1"/>
+          </a:fontRef>
+        </p:style>
+      </p:cxnSp>
     </p:spTree>
     <p:extLst>
       <p:ext uri="{BB962C8B-B14F-4D97-AF65-F5344CB8AC3E}">
@@ -35391,6 +35465,94 @@
                       </p:childTnLst>
                     </p:cTn>
                   </p:par>
+                  <p:par>
+                    <p:cTn id="31" fill="hold">
+                      <p:stCondLst>
+                        <p:cond delay="indefinite"/>
+                      </p:stCondLst>
+                      <p:childTnLst>
+                        <p:par>
+                          <p:cTn id="32" fill="hold">
+                            <p:stCondLst>
+                              <p:cond delay="0"/>
+                            </p:stCondLst>
+                            <p:childTnLst>
+                              <p:par>
+                                <p:cTn id="33" presetID="10" presetClass="entr" presetSubtype="0" fill="hold" nodeType="clickEffect">
+                                  <p:stCondLst>
+                                    <p:cond delay="0"/>
+                                  </p:stCondLst>
+                                  <p:childTnLst>
+                                    <p:set>
+                                      <p:cBhvr>
+                                        <p:cTn id="34" dur="1" fill="hold">
+                                          <p:stCondLst>
+                                            <p:cond delay="0"/>
+                                          </p:stCondLst>
+                                        </p:cTn>
+                                        <p:tgtEl>
+                                          <p:spTgt spid="9"/>
+                                        </p:tgtEl>
+                                        <p:attrNameLst>
+                                          <p:attrName>style.visibility</p:attrName>
+                                        </p:attrNameLst>
+                                      </p:cBhvr>
+                                      <p:to>
+                                        <p:strVal val="visible"/>
+                                      </p:to>
+                                    </p:set>
+                                    <p:animEffect transition="in" filter="fade">
+                                      <p:cBhvr>
+                                        <p:cTn id="35" dur="500"/>
+                                        <p:tgtEl>
+                                          <p:spTgt spid="9"/>
+                                        </p:tgtEl>
+                                      </p:cBhvr>
+                                    </p:animEffect>
+                                  </p:childTnLst>
+                                </p:cTn>
+                              </p:par>
+                              <p:par>
+                                <p:cTn id="36" presetID="10" presetClass="entr" presetSubtype="0" fill="hold" nodeType="withEffect">
+                                  <p:stCondLst>
+                                    <p:cond delay="0"/>
+                                  </p:stCondLst>
+                                  <p:childTnLst>
+                                    <p:set>
+                                      <p:cBhvr>
+                                        <p:cTn id="37" dur="1" fill="hold">
+                                          <p:stCondLst>
+                                            <p:cond delay="0"/>
+                                          </p:stCondLst>
+                                        </p:cTn>
+                                        <p:tgtEl>
+                                          <p:spTgt spid="7"/>
+                                        </p:tgtEl>
+                                        <p:attrNameLst>
+                                          <p:attrName>style.visibility</p:attrName>
+                                        </p:attrNameLst>
+                                      </p:cBhvr>
+                                      <p:to>
+                                        <p:strVal val="visible"/>
+                                      </p:to>
+                                    </p:set>
+                                    <p:animEffect transition="in" filter="fade">
+                                      <p:cBhvr>
+                                        <p:cTn id="38" dur="500"/>
+                                        <p:tgtEl>
+                                          <p:spTgt spid="7"/>
+                                        </p:tgtEl>
+                                      </p:cBhvr>
+                                    </p:animEffect>
+                                  </p:childTnLst>
+                                </p:cTn>
+                              </p:par>
+                            </p:childTnLst>
+                          </p:cTn>
+                        </p:par>
+                      </p:childTnLst>
+                    </p:cTn>
+                  </p:par>
                 </p:childTnLst>
               </p:cTn>
               <p:prevCondLst>
@@ -35561,7 +35723,7 @@
             </a:r>
             <a:r>
               <a:rPr lang="en-US" dirty="0"/>
-              <a:t>– a flag that classifies a collection of points in image </a:t>
+              <a:t>– a flag that classifies a collection of key points in image </a:t>
             </a:r>
             <a:r>
               <a:rPr lang="en-US" b="1" i="1" dirty="0"/>
@@ -35577,7 +35739,7 @@
                   <a:schemeClr val="accent2"/>
                 </a:solidFill>
               </a:rPr>
-              <a:t>(mathematical definition needs to be refined*)</a:t>
+              <a:t>(mathematical definition needs to be defined*)</a:t>
             </a:r>
             <a:endParaRPr lang="en-US" dirty="0"/>
           </a:p>
@@ -35605,7 +35767,7 @@
                   <a:schemeClr val="accent2"/>
                 </a:solidFill>
               </a:rPr>
-              <a:t>(mathematical definition needs to be refined*)</a:t>
+              <a:t>(mathematical definition needs to be defined*)</a:t>
             </a:r>
             <a:endParaRPr lang="en-US" dirty="0"/>
           </a:p>
@@ -36065,7 +36227,12 @@
             <p:ph type="body" sz="quarter" idx="13"/>
           </p:nvPr>
         </p:nvSpPr>
-        <p:spPr/>
+        <p:spPr>
+          <a:xfrm>
+            <a:off x="742950" y="1562100"/>
+            <a:ext cx="11321231" cy="7829550"/>
+          </a:xfrm>
+        </p:spPr>
         <p:txBody>
           <a:bodyPr/>
           <a:lstStyle/>
@@ -36554,7 +36721,7 @@
                   <a:schemeClr val="bg1"/>
                 </a:solidFill>
               </a:rPr>
-              <a:t>[1] Y. Wang, W. Jiang, K. Huang, S. </a:t>
+              <a:t>Y. Wang, W. Jiang, K. Huang, S. </a:t>
             </a:r>
             <a:r>
               <a:rPr lang="en-CA" dirty="0" err="1">
@@ -41566,7 +41733,7 @@
             <a:pPr lvl="2"/>
             <a:r>
               <a:rPr lang="en-CA" dirty="0"/>
-              <a:t>Imagery vector **</a:t>
+              <a:t>Imagery vector ** (Greyscale vs RBG)</a:t>
             </a:r>
           </a:p>
           <a:p>
@@ -41590,7 +41757,7 @@
             <a:pPr lvl="1"/>
             <a:r>
               <a:rPr lang="en-CA" sz="2400" b="1" dirty="0"/>
-              <a:t>IN4B) </a:t>
+              <a:t>In4B) </a:t>
             </a:r>
             <a:r>
               <a:rPr lang="en-CA" sz="2400" dirty="0"/>
@@ -41607,14 +41774,14 @@
             </a:r>
             <a:r>
               <a:rPr lang="en-CA" sz="2800" dirty="0"/>
-              <a:t>Feature Comparison Comparison**</a:t>
+              <a:t>Feature Comparison Algorithm**</a:t>
             </a:r>
           </a:p>
           <a:p>
             <a:pPr lvl="1"/>
             <a:r>
               <a:rPr lang="en-CA" sz="2400" b="1" dirty="0"/>
-              <a:t>IN5B) </a:t>
+              <a:t>In5B) </a:t>
             </a:r>
             <a:r>
               <a:rPr lang="en-CA" sz="2400" dirty="0"/>
@@ -43252,7 +43419,7 @@
           <p:nvPr>
             <p:extLst>
               <p:ext uri="{D42A27DB-BD31-4B8C-83A1-F6EECF244321}">
-                <p14:modId xmlns:p14="http://schemas.microsoft.com/office/powerpoint/2010/main" val="2959618921"/>
+                <p14:modId xmlns:p14="http://schemas.microsoft.com/office/powerpoint/2010/main" val="2462419949"/>
               </p:ext>
             </p:extLst>
           </p:nvPr>
@@ -43723,7 +43890,19 @@
                       </a:pPr>
                       <a:r>
                         <a:rPr lang="en-US" dirty="0"/>
-                        <a:t>Hessian-Based Interest Points [LC01]</a:t>
+                        <a:t>Hessian-Based Interest Points [</a:t>
+                      </a:r>
+                      <a:r>
+                        <a:rPr lang="en-US" b="1" dirty="0">
+                          <a:solidFill>
+                            <a:srgbClr val="C00000"/>
+                          </a:solidFill>
+                        </a:rPr>
+                        <a:t>LC01</a:t>
+                      </a:r>
+                      <a:r>
+                        <a:rPr lang="en-US" dirty="0"/>
+                        <a:t>]</a:t>
                       </a:r>
                       <a:endParaRPr lang="en-CA" dirty="0"/>
                     </a:p>
@@ -43821,6 +44000,128 @@
                                           </p:stCondLst>
                                         </p:cTn>
                                         <p:tgtEl>
+                                          <p:spTgt spid="9">
+                                            <p:txEl>
+                                              <p:pRg st="1" end="1"/>
+                                            </p:txEl>
+                                          </p:spTgt>
+                                        </p:tgtEl>
+                                        <p:attrNameLst>
+                                          <p:attrName>style.visibility</p:attrName>
+                                        </p:attrNameLst>
+                                      </p:cBhvr>
+                                      <p:to>
+                                        <p:strVal val="visible"/>
+                                      </p:to>
+                                    </p:set>
+                                    <p:animEffect transition="in" filter="fade">
+                                      <p:cBhvr>
+                                        <p:cTn id="7" dur="500"/>
+                                        <p:tgtEl>
+                                          <p:spTgt spid="9">
+                                            <p:txEl>
+                                              <p:pRg st="1" end="1"/>
+                                            </p:txEl>
+                                          </p:spTgt>
+                                        </p:tgtEl>
+                                      </p:cBhvr>
+                                    </p:animEffect>
+                                  </p:childTnLst>
+                                </p:cTn>
+                              </p:par>
+                            </p:childTnLst>
+                          </p:cTn>
+                        </p:par>
+                      </p:childTnLst>
+                    </p:cTn>
+                  </p:par>
+                  <p:par>
+                    <p:cTn id="8" fill="hold">
+                      <p:stCondLst>
+                        <p:cond delay="indefinite"/>
+                      </p:stCondLst>
+                      <p:childTnLst>
+                        <p:par>
+                          <p:cTn id="9" fill="hold">
+                            <p:stCondLst>
+                              <p:cond delay="0"/>
+                            </p:stCondLst>
+                            <p:childTnLst>
+                              <p:par>
+                                <p:cTn id="10" presetID="10" presetClass="entr" presetSubtype="0" fill="hold" nodeType="clickEffect">
+                                  <p:stCondLst>
+                                    <p:cond delay="0"/>
+                                  </p:stCondLst>
+                                  <p:childTnLst>
+                                    <p:set>
+                                      <p:cBhvr>
+                                        <p:cTn id="11" dur="1" fill="hold">
+                                          <p:stCondLst>
+                                            <p:cond delay="0"/>
+                                          </p:stCondLst>
+                                        </p:cTn>
+                                        <p:tgtEl>
+                                          <p:spTgt spid="9">
+                                            <p:txEl>
+                                              <p:pRg st="2" end="2"/>
+                                            </p:txEl>
+                                          </p:spTgt>
+                                        </p:tgtEl>
+                                        <p:attrNameLst>
+                                          <p:attrName>style.visibility</p:attrName>
+                                        </p:attrNameLst>
+                                      </p:cBhvr>
+                                      <p:to>
+                                        <p:strVal val="visible"/>
+                                      </p:to>
+                                    </p:set>
+                                    <p:animEffect transition="in" filter="fade">
+                                      <p:cBhvr>
+                                        <p:cTn id="12" dur="500"/>
+                                        <p:tgtEl>
+                                          <p:spTgt spid="9">
+                                            <p:txEl>
+                                              <p:pRg st="2" end="2"/>
+                                            </p:txEl>
+                                          </p:spTgt>
+                                        </p:tgtEl>
+                                      </p:cBhvr>
+                                    </p:animEffect>
+                                  </p:childTnLst>
+                                </p:cTn>
+                              </p:par>
+                            </p:childTnLst>
+                          </p:cTn>
+                        </p:par>
+                      </p:childTnLst>
+                    </p:cTn>
+                  </p:par>
+                  <p:par>
+                    <p:cTn id="13" fill="hold">
+                      <p:stCondLst>
+                        <p:cond delay="indefinite"/>
+                      </p:stCondLst>
+                      <p:childTnLst>
+                        <p:par>
+                          <p:cTn id="14" fill="hold">
+                            <p:stCondLst>
+                              <p:cond delay="0"/>
+                            </p:stCondLst>
+                            <p:childTnLst>
+                              <p:par>
+                                <p:cTn id="15" presetID="10" presetClass="entr" presetSubtype="0" fill="hold" nodeType="clickEffect">
+                                  <p:stCondLst>
+                                    <p:cond delay="0"/>
+                                  </p:stCondLst>
+                                  <p:childTnLst>
+                                    <p:set>
+                                      <p:cBhvr>
+                                        <p:cTn id="16" dur="1" fill="hold">
+                                          <p:stCondLst>
+                                            <p:cond delay="0"/>
+                                          </p:stCondLst>
+                                        </p:cTn>
+                                        <p:tgtEl>
                                           <p:spTgt spid="7"/>
                                         </p:tgtEl>
                                         <p:attrNameLst>
@@ -43833,7 +44134,7 @@
                                     </p:set>
                                     <p:animEffect transition="in" filter="fade">
                                       <p:cBhvr>
-                                        <p:cTn id="7" dur="500"/>
+                                        <p:cTn id="17" dur="500"/>
                                         <p:tgtEl>
                                           <p:spTgt spid="7"/>
                                         </p:tgtEl>
@@ -45082,8 +45383,8 @@
         </p:blipFill>
         <p:spPr>
           <a:xfrm>
-            <a:off x="10450514" y="3642107"/>
-            <a:ext cx="3124865" cy="2797151"/>
+            <a:off x="8986629" y="3642107"/>
+            <a:ext cx="3851331" cy="3447430"/>
           </a:xfrm>
           <a:prstGeom prst="rect">
             <a:avLst/>
@@ -45104,8 +45405,8 @@
         </p:nvSpPr>
         <p:spPr>
           <a:xfrm>
-            <a:off x="10450514" y="7304003"/>
-            <a:ext cx="6114886" cy="1200329"/>
+            <a:off x="9620691" y="8612297"/>
+            <a:ext cx="8969159" cy="923330"/>
           </a:xfrm>
           <a:prstGeom prst="rect">
             <a:avLst/>
@@ -45219,8 +45520,8 @@
         </p:blipFill>
         <p:spPr>
           <a:xfrm>
-            <a:off x="13851836" y="3642107"/>
-            <a:ext cx="3124865" cy="3447430"/>
+            <a:off x="13896081" y="3642107"/>
+            <a:ext cx="3971099" cy="4381016"/>
           </a:xfrm>
           <a:prstGeom prst="rect">
             <a:avLst/>
@@ -46840,6 +47141,15 @@
 </file>
 
 <file path=customXml/item1.xml><?xml version="1.0" encoding="utf-8"?>
+<?mso-contentType ?>
+<FormTemplates xmlns="http://schemas.microsoft.com/sharepoint/v3/contenttype/forms">
+  <Display>DocumentLibraryForm</Display>
+  <Edit>DocumentLibraryForm</Edit>
+  <New>DocumentLibraryForm</New>
+</FormTemplates>
+</file>
+
+<file path=customXml/item2.xml><?xml version="1.0" encoding="utf-8"?>
 <ct:contentTypeSchema xmlns:ct="http://schemas.microsoft.com/office/2006/metadata/contentType" xmlns:ma="http://schemas.microsoft.com/office/2006/metadata/properties/metaAttributes" ct:_="" ma:_="" ma:contentTypeName="Document" ma:contentTypeID="0x01010042A38F74C9162C478D8F165ED878BC5B" ma:contentTypeVersion="15" ma:contentTypeDescription="Create a new document." ma:contentTypeScope="" ma:versionID="e47a23570109c110b7798bafe919556a">
   <xsd:schema xmlns:xsd="http://www.w3.org/2001/XMLSchema" xmlns:xs="http://www.w3.org/2001/XMLSchema" xmlns:p="http://schemas.microsoft.com/office/2006/metadata/properties" xmlns:ns2="88b0a0ff-d3b5-49df-8481-a9e681bdc8a6" xmlns:ns3="56b50f8d-715f-480a-838b-715664365a53" targetNamespace="http://schemas.microsoft.com/office/2006/metadata/properties" ma:root="true" ma:fieldsID="fca2d4002b9751db08dcbe4d29144a3f" ns2:_="" ns3:_="">
     <xsd:import namespace="88b0a0ff-d3b5-49df-8481-a9e681bdc8a6"/>
@@ -47074,7 +47384,7 @@
 </ct:contentTypeSchema>
 </file>
 
-<file path=customXml/item2.xml><?xml version="1.0" encoding="utf-8"?>
+<file path=customXml/item3.xml><?xml version="1.0" encoding="utf-8"?>
 <p:properties xmlns:p="http://schemas.microsoft.com/office/2006/metadata/properties" xmlns:xsi="http://www.w3.org/2001/XMLSchema-instance" xmlns:pc="http://schemas.microsoft.com/office/infopath/2007/PartnerControls">
   <documentManagement>
     <SharedWithUsers xmlns="56b50f8d-715f-480a-838b-715664365a53">
@@ -47147,16 +47457,15 @@
 </p:properties>
 </file>
 
-<file path=customXml/item3.xml><?xml version="1.0" encoding="utf-8"?>
-<?mso-contentType ?>
-<FormTemplates xmlns="http://schemas.microsoft.com/sharepoint/v3/contenttype/forms">
-  <Display>DocumentLibraryForm</Display>
-  <Edit>DocumentLibraryForm</Edit>
-  <New>DocumentLibraryForm</New>
-</FormTemplates>
+<file path=customXml/itemProps1.xml><?xml version="1.0" encoding="utf-8"?>
+<ds:datastoreItem xmlns:ds="http://schemas.openxmlformats.org/officeDocument/2006/customXml" ds:itemID="{328C2D47-8966-498E-811F-A1F66EDD0AA6}">
+  <ds:schemaRefs>
+    <ds:schemaRef ds:uri="http://schemas.microsoft.com/sharepoint/v3/contenttype/forms"/>
+  </ds:schemaRefs>
+</ds:datastoreItem>
 </file>
 
-<file path=customXml/itemProps1.xml><?xml version="1.0" encoding="utf-8"?>
+<file path=customXml/itemProps2.xml><?xml version="1.0" encoding="utf-8"?>
 <ds:datastoreItem xmlns:ds="http://schemas.openxmlformats.org/officeDocument/2006/customXml" ds:itemID="{C57527D8-6F85-456C-AD90-B5FF6D7A1E5E}">
   <ds:schemaRefs>
     <ds:schemaRef ds:uri="http://schemas.microsoft.com/office/2006/metadata/contentType"/>
@@ -47175,29 +47484,19 @@
 </ds:datastoreItem>
 </file>
 
-<file path=customXml/itemProps2.xml><?xml version="1.0" encoding="utf-8"?>
+<file path=customXml/itemProps3.xml><?xml version="1.0" encoding="utf-8"?>
 <ds:datastoreItem xmlns:ds="http://schemas.openxmlformats.org/officeDocument/2006/customXml" ds:itemID="{B61FCE0B-163E-4885-9228-6F21EEAE8497}">
   <ds:schemaRefs>
-    <ds:schemaRef ds:uri="d40a990f-0aae-4c25-9c28-eaaf496ed2a5"/>
+    <ds:schemaRef ds:uri="http://www.w3.org/XML/1998/namespace"/>
+    <ds:schemaRef ds:uri="http://schemas.microsoft.com/office/2006/metadata/properties"/>
+    <ds:schemaRef ds:uri="http://purl.org/dc/terms/"/>
+    <ds:schemaRef ds:uri="http://purl.org/dc/elements/1.1/"/>
+    <ds:schemaRef ds:uri="88b0a0ff-d3b5-49df-8481-a9e681bdc8a6"/>
     <ds:schemaRef ds:uri="http://schemas.microsoft.com/office/infopath/2007/PartnerControls"/>
-    <ds:schemaRef ds:uri="http://purl.org/dc/terms/"/>
+    <ds:schemaRef ds:uri="http://schemas.microsoft.com/office/2006/documentManagement/types"/>
     <ds:schemaRef ds:uri="http://schemas.openxmlformats.org/package/2006/metadata/core-properties"/>
-    <ds:schemaRef ds:uri="http://schemas.microsoft.com/office/2006/documentManagement/types"/>
-    <ds:schemaRef ds:uri="http://purl.org/dc/elements/1.1/"/>
-    <ds:schemaRef ds:uri="f1f8a7e4-56c1-4563-85ae-320e346f1ca6"/>
-    <ds:schemaRef ds:uri="http://schemas.microsoft.com/office/2006/metadata/properties"/>
-    <ds:schemaRef ds:uri="http://www.w3.org/XML/1998/namespace"/>
+    <ds:schemaRef ds:uri="56b50f8d-715f-480a-838b-715664365a53"/>
     <ds:schemaRef ds:uri="http://purl.org/dc/dcmitype/"/>
-    <ds:schemaRef ds:uri="56b50f8d-715f-480a-838b-715664365a53"/>
-    <ds:schemaRef ds:uri="88b0a0ff-d3b5-49df-8481-a9e681bdc8a6"/>
-  </ds:schemaRefs>
-</ds:datastoreItem>
-</file>
-
-<file path=customXml/itemProps3.xml><?xml version="1.0" encoding="utf-8"?>
-<ds:datastoreItem xmlns:ds="http://schemas.openxmlformats.org/officeDocument/2006/customXml" ds:itemID="{328C2D47-8966-498E-811F-A1F66EDD0AA6}">
-  <ds:schemaRefs>
-    <ds:schemaRef ds:uri="http://schemas.microsoft.com/sharepoint/v3/contenttype/forms"/>
   </ds:schemaRefs>
 </ds:datastoreItem>
 </file>
</xml_diff>